<commit_message>
Edited Depth and Vision project. Added images
</commit_message>
<xml_diff>
--- a/Qt + OpenCV.pptx
+++ b/Qt + OpenCV.pptx
@@ -6,13 +6,14 @@
   </p:sldMasterIdLst>
   <p:sldIdLst>
     <p:sldId id="256" r:id="rId2"/>
-    <p:sldId id="257" r:id="rId3"/>
-    <p:sldId id="258" r:id="rId4"/>
-    <p:sldId id="259" r:id="rId5"/>
-    <p:sldId id="261" r:id="rId6"/>
-    <p:sldId id="260" r:id="rId7"/>
-    <p:sldId id="263" r:id="rId8"/>
-    <p:sldId id="262" r:id="rId9"/>
+    <p:sldId id="264" r:id="rId3"/>
+    <p:sldId id="257" r:id="rId4"/>
+    <p:sldId id="258" r:id="rId5"/>
+    <p:sldId id="259" r:id="rId6"/>
+    <p:sldId id="261" r:id="rId7"/>
+    <p:sldId id="260" r:id="rId8"/>
+    <p:sldId id="263" r:id="rId9"/>
+    <p:sldId id="262" r:id="rId10"/>
   </p:sldIdLst>
   <p:sldSz cx="12192000" cy="6858000"/>
   <p:notesSz cx="6858000" cy="9144000"/>
@@ -111,6 +112,11 @@
       </a:defRPr>
     </a:lvl9pPr>
   </p:defaultTextStyle>
+  <p:extLst>
+    <p:ext uri="{EFAFB233-063F-42B5-8137-9DF3F51BA10A}">
+      <p15:sldGuideLst xmlns:p15="http://schemas.microsoft.com/office/powerpoint/2012/main"/>
+    </p:ext>
+  </p:extLst>
 </p:presentation>
 </file>
 
@@ -245,7 +251,7 @@
           <a:p>
             <a:fld id="{E15C8B41-F0B1-45FE-B78A-5AE3BD5B06E4}" type="datetimeFigureOut">
               <a:rPr lang="nb-NO" smtClean="0"/>
-              <a:t>24.10.2015</a:t>
+              <a:t>23.11.2015</a:t>
             </a:fld>
             <a:endParaRPr lang="nb-NO"/>
           </a:p>
@@ -415,7 +421,7 @@
           <a:p>
             <a:fld id="{E15C8B41-F0B1-45FE-B78A-5AE3BD5B06E4}" type="datetimeFigureOut">
               <a:rPr lang="nb-NO" smtClean="0"/>
-              <a:t>24.10.2015</a:t>
+              <a:t>23.11.2015</a:t>
             </a:fld>
             <a:endParaRPr lang="nb-NO"/>
           </a:p>
@@ -595,7 +601,7 @@
           <a:p>
             <a:fld id="{E15C8B41-F0B1-45FE-B78A-5AE3BD5B06E4}" type="datetimeFigureOut">
               <a:rPr lang="nb-NO" smtClean="0"/>
-              <a:t>24.10.2015</a:t>
+              <a:t>23.11.2015</a:t>
             </a:fld>
             <a:endParaRPr lang="nb-NO"/>
           </a:p>
@@ -765,7 +771,7 @@
           <a:p>
             <a:fld id="{E15C8B41-F0B1-45FE-B78A-5AE3BD5B06E4}" type="datetimeFigureOut">
               <a:rPr lang="nb-NO" smtClean="0"/>
-              <a:t>24.10.2015</a:t>
+              <a:t>23.11.2015</a:t>
             </a:fld>
             <a:endParaRPr lang="nb-NO"/>
           </a:p>
@@ -1011,7 +1017,7 @@
           <a:p>
             <a:fld id="{E15C8B41-F0B1-45FE-B78A-5AE3BD5B06E4}" type="datetimeFigureOut">
               <a:rPr lang="nb-NO" smtClean="0"/>
-              <a:t>24.10.2015</a:t>
+              <a:t>23.11.2015</a:t>
             </a:fld>
             <a:endParaRPr lang="nb-NO"/>
           </a:p>
@@ -1243,7 +1249,7 @@
           <a:p>
             <a:fld id="{E15C8B41-F0B1-45FE-B78A-5AE3BD5B06E4}" type="datetimeFigureOut">
               <a:rPr lang="nb-NO" smtClean="0"/>
-              <a:t>24.10.2015</a:t>
+              <a:t>23.11.2015</a:t>
             </a:fld>
             <a:endParaRPr lang="nb-NO"/>
           </a:p>
@@ -1610,7 +1616,7 @@
           <a:p>
             <a:fld id="{E15C8B41-F0B1-45FE-B78A-5AE3BD5B06E4}" type="datetimeFigureOut">
               <a:rPr lang="nb-NO" smtClean="0"/>
-              <a:t>24.10.2015</a:t>
+              <a:t>23.11.2015</a:t>
             </a:fld>
             <a:endParaRPr lang="nb-NO"/>
           </a:p>
@@ -1728,7 +1734,7 @@
           <a:p>
             <a:fld id="{E15C8B41-F0B1-45FE-B78A-5AE3BD5B06E4}" type="datetimeFigureOut">
               <a:rPr lang="nb-NO" smtClean="0"/>
-              <a:t>24.10.2015</a:t>
+              <a:t>23.11.2015</a:t>
             </a:fld>
             <a:endParaRPr lang="nb-NO"/>
           </a:p>
@@ -1823,7 +1829,7 @@
           <a:p>
             <a:fld id="{E15C8B41-F0B1-45FE-B78A-5AE3BD5B06E4}" type="datetimeFigureOut">
               <a:rPr lang="nb-NO" smtClean="0"/>
-              <a:t>24.10.2015</a:t>
+              <a:t>23.11.2015</a:t>
             </a:fld>
             <a:endParaRPr lang="nb-NO"/>
           </a:p>
@@ -2100,7 +2106,7 @@
           <a:p>
             <a:fld id="{E15C8B41-F0B1-45FE-B78A-5AE3BD5B06E4}" type="datetimeFigureOut">
               <a:rPr lang="nb-NO" smtClean="0"/>
-              <a:t>24.10.2015</a:t>
+              <a:t>23.11.2015</a:t>
             </a:fld>
             <a:endParaRPr lang="nb-NO"/>
           </a:p>
@@ -2353,7 +2359,7 @@
           <a:p>
             <a:fld id="{E15C8B41-F0B1-45FE-B78A-5AE3BD5B06E4}" type="datetimeFigureOut">
               <a:rPr lang="nb-NO" smtClean="0"/>
-              <a:t>24.10.2015</a:t>
+              <a:t>23.11.2015</a:t>
             </a:fld>
             <a:endParaRPr lang="nb-NO"/>
           </a:p>
@@ -2566,7 +2572,7 @@
           <a:p>
             <a:fld id="{E15C8B41-F0B1-45FE-B78A-5AE3BD5B06E4}" type="datetimeFigureOut">
               <a:rPr lang="nb-NO" smtClean="0"/>
-              <a:t>24.10.2015</a:t>
+              <a:t>23.11.2015</a:t>
             </a:fld>
             <a:endParaRPr lang="nb-NO"/>
           </a:p>
@@ -3069,7 +3075,7 @@
       </p:grpSpPr>
       <p:sp>
         <p:nvSpPr>
-          <p:cNvPr id="2" name="Tittel 1"/>
+          <p:cNvPr id="2" name="Title 1"/>
           <p:cNvSpPr>
             <a:spLocks noGrp="1"/>
           </p:cNvSpPr>
@@ -3084,7 +3090,7 @@
           <a:p>
             <a:r>
               <a:rPr lang="nb-NO" dirty="0" smtClean="0"/>
-              <a:t>Intro. Hvorfor</a:t>
+              <a:t>Om meg</a:t>
             </a:r>
             <a:endParaRPr lang="nb-NO" dirty="0"/>
           </a:p>
@@ -3092,7 +3098,7 @@
       </p:sp>
       <p:sp>
         <p:nvSpPr>
-          <p:cNvPr id="3" name="Plassholder for innhold 2"/>
+          <p:cNvPr id="3" name="Content Placeholder 2"/>
           <p:cNvSpPr>
             <a:spLocks noGrp="1"/>
           </p:cNvSpPr>
@@ -3104,6 +3110,18 @@
         <p:txBody>
           <a:bodyPr/>
           <a:lstStyle/>
+          <a:p>
+            <a:r>
+              <a:rPr lang="nb-NO" dirty="0" smtClean="0"/>
+              <a:t>Heter Vegard</a:t>
+            </a:r>
+          </a:p>
+          <a:p>
+            <a:r>
+              <a:rPr lang="nb-NO" dirty="0" smtClean="0"/>
+              <a:t>Kybernetikk, 5-årig</a:t>
+            </a:r>
+          </a:p>
           <a:p>
             <a:endParaRPr lang="nb-NO" dirty="0"/>
           </a:p>
@@ -3112,7 +3130,7 @@
     </p:spTree>
     <p:extLst>
       <p:ext uri="{BB962C8B-B14F-4D97-AF65-F5344CB8AC3E}">
-        <p14:creationId xmlns:p14="http://schemas.microsoft.com/office/powerpoint/2010/main" val="2029543403"/>
+        <p14:creationId xmlns:p14="http://schemas.microsoft.com/office/powerpoint/2010/main" val="1428963710"/>
       </p:ext>
     </p:extLst>
   </p:cSld>
@@ -3156,23 +3174,7 @@
           <a:p>
             <a:r>
               <a:rPr lang="nb-NO" dirty="0" smtClean="0"/>
-              <a:t>Hva er </a:t>
-            </a:r>
-            <a:r>
-              <a:rPr lang="nb-NO" dirty="0" err="1" smtClean="0"/>
-              <a:t>Qt</a:t>
-            </a:r>
-            <a:r>
-              <a:rPr lang="nb-NO" dirty="0" smtClean="0"/>
-              <a:t>? Hvorfor </a:t>
-            </a:r>
-            <a:r>
-              <a:rPr lang="nb-NO" dirty="0" err="1" smtClean="0"/>
-              <a:t>Qt</a:t>
-            </a:r>
-            <a:r>
-              <a:rPr lang="nb-NO" dirty="0" smtClean="0"/>
-              <a:t>?</a:t>
+              <a:t>My Project</a:t>
             </a:r>
             <a:endParaRPr lang="nb-NO" dirty="0"/>
           </a:p>
@@ -3193,14 +3195,14 @@
           <a:bodyPr/>
           <a:lstStyle/>
           <a:p>
-            <a:endParaRPr lang="nb-NO"/>
+            <a:endParaRPr lang="nb-NO" dirty="0"/>
           </a:p>
         </p:txBody>
       </p:sp>
     </p:spTree>
     <p:extLst>
       <p:ext uri="{BB962C8B-B14F-4D97-AF65-F5344CB8AC3E}">
-        <p14:creationId xmlns:p14="http://schemas.microsoft.com/office/powerpoint/2010/main" val="41952554"/>
+        <p14:creationId xmlns:p14="http://schemas.microsoft.com/office/powerpoint/2010/main" val="2029543403"/>
       </p:ext>
     </p:extLst>
   </p:cSld>
@@ -3227,9 +3229,38 @@
           <a:chExt cx="0" cy="0"/>
         </a:xfrm>
       </p:grpSpPr>
-      <p:sp>
-        <p:nvSpPr>
-          <p:cNvPr id="2" name="Tittel 1"/>
+      <p:pic>
+        <p:nvPicPr>
+          <p:cNvPr id="4" name="Content Placeholder 3"/>
+          <p:cNvPicPr>
+            <a:picLocks noGrp="1" noChangeAspect="1"/>
+          </p:cNvPicPr>
+          <p:nvPr>
+            <p:ph idx="1"/>
+          </p:nvPr>
+        </p:nvPicPr>
+        <p:blipFill>
+          <a:blip r:embed="rId2">
+            <a:extLst>
+              <a:ext uri="{28A0092B-C50C-407E-A947-70E740481C1C}">
+                <a14:useLocalDpi xmlns:a14="http://schemas.microsoft.com/office/drawing/2010/main" val="0"/>
+              </a:ext>
+            </a:extLst>
+          </a:blip>
+          <a:stretch>
+            <a:fillRect/>
+          </a:stretch>
+        </p:blipFill>
+        <p:spPr>
+          <a:xfrm>
+            <a:off x="10104895" y="365125"/>
+            <a:ext cx="1549427" cy="1549427"/>
+          </a:xfrm>
+        </p:spPr>
+      </p:pic>
+      <p:sp>
+        <p:nvSpPr>
+          <p:cNvPr id="5" name="Title 4"/>
           <p:cNvSpPr>
             <a:spLocks noGrp="1"/>
           </p:cNvSpPr>
@@ -3244,7 +3275,11 @@
           <a:p>
             <a:r>
               <a:rPr lang="nb-NO" dirty="0" err="1" smtClean="0"/>
-              <a:t>OpenCV</a:t>
+              <a:t>Qt</a:t>
+            </a:r>
+            <a:r>
+              <a:rPr lang="nb-NO" dirty="0" smtClean="0"/>
+              <a:t> </a:t>
             </a:r>
             <a:endParaRPr lang="nb-NO" dirty="0"/>
           </a:p>
@@ -3252,27 +3287,109 @@
       </p:sp>
       <p:sp>
         <p:nvSpPr>
-          <p:cNvPr id="3" name="Plassholder for innhold 2"/>
-          <p:cNvSpPr>
-            <a:spLocks noGrp="1"/>
-          </p:cNvSpPr>
-          <p:nvPr>
-            <p:ph idx="1"/>
-          </p:nvPr>
-        </p:nvSpPr>
-        <p:spPr/>
-        <p:txBody>
-          <a:bodyPr/>
-          <a:lstStyle/>
-          <a:p>
-            <a:endParaRPr lang="nb-NO"/>
+          <p:cNvPr id="6" name="TextBox 5"/>
+          <p:cNvSpPr txBox="1"/>
+          <p:nvPr/>
+        </p:nvSpPr>
+        <p:spPr>
+          <a:xfrm>
+            <a:off x="635431" y="1914552"/>
+            <a:ext cx="10523349" cy="1477328"/>
+          </a:xfrm>
+          <a:prstGeom prst="rect">
+            <a:avLst/>
+          </a:prstGeom>
+          <a:noFill/>
+        </p:spPr>
+        <p:txBody>
+          <a:bodyPr wrap="square" rtlCol="0">
+            <a:spAutoFit/>
+          </a:bodyPr>
+          <a:lstStyle/>
+          <a:p>
+            <a:r>
+              <a:rPr lang="nb-NO" dirty="0" err="1" smtClean="0"/>
+              <a:t>Qt</a:t>
+            </a:r>
+            <a:r>
+              <a:rPr lang="nb-NO" dirty="0" smtClean="0"/>
+              <a:t> is</a:t>
+            </a:r>
+          </a:p>
+          <a:p>
+            <a:endParaRPr lang="nb-NO" dirty="0"/>
+          </a:p>
+          <a:p>
+            <a:pPr marL="285750" indent="-285750">
+              <a:buFont typeface="Arial" panose="020B0604020202020204" pitchFamily="34" charset="0"/>
+              <a:buChar char="•"/>
+            </a:pPr>
+            <a:r>
+              <a:rPr lang="nb-NO" dirty="0" smtClean="0"/>
+              <a:t>A </a:t>
+            </a:r>
+            <a:r>
+              <a:rPr lang="nb-NO" dirty="0" err="1" smtClean="0"/>
+              <a:t>framework</a:t>
+            </a:r>
+            <a:endParaRPr lang="nb-NO" dirty="0" smtClean="0"/>
+          </a:p>
+          <a:p>
+            <a:pPr marL="285750" indent="-285750">
+              <a:buFont typeface="Arial" panose="020B0604020202020204" pitchFamily="34" charset="0"/>
+              <a:buChar char="•"/>
+            </a:pPr>
+            <a:r>
+              <a:rPr lang="nb-NO" dirty="0" smtClean="0"/>
+              <a:t>An IDE – </a:t>
+            </a:r>
+            <a:r>
+              <a:rPr lang="nb-NO" dirty="0" err="1" smtClean="0"/>
+              <a:t>Qt</a:t>
+            </a:r>
+            <a:r>
+              <a:rPr lang="nb-NO" dirty="0" smtClean="0"/>
+              <a:t> </a:t>
+            </a:r>
+            <a:r>
+              <a:rPr lang="nb-NO" dirty="0" err="1" smtClean="0"/>
+              <a:t>Creator</a:t>
+            </a:r>
+            <a:endParaRPr lang="nb-NO" dirty="0" smtClean="0"/>
+          </a:p>
+          <a:p>
+            <a:pPr marL="285750" indent="-285750">
+              <a:buFont typeface="Arial" panose="020B0604020202020204" pitchFamily="34" charset="0"/>
+              <a:buChar char="•"/>
+            </a:pPr>
+            <a:r>
+              <a:rPr lang="nb-NO" dirty="0" err="1" smtClean="0"/>
+              <a:t>Various</a:t>
+            </a:r>
+            <a:r>
+              <a:rPr lang="nb-NO" dirty="0" smtClean="0"/>
+              <a:t> </a:t>
+            </a:r>
+            <a:r>
+              <a:rPr lang="nb-NO" dirty="0" err="1" smtClean="0"/>
+              <a:t>workflow</a:t>
+            </a:r>
+            <a:r>
+              <a:rPr lang="nb-NO" dirty="0" smtClean="0"/>
+              <a:t> </a:t>
+            </a:r>
+            <a:r>
+              <a:rPr lang="nb-NO" dirty="0" err="1" smtClean="0"/>
+              <a:t>tools</a:t>
+            </a:r>
+            <a:endParaRPr lang="nb-NO" dirty="0"/>
           </a:p>
         </p:txBody>
       </p:sp>
     </p:spTree>
     <p:extLst>
       <p:ext uri="{BB962C8B-B14F-4D97-AF65-F5344CB8AC3E}">
-        <p14:creationId xmlns:p14="http://schemas.microsoft.com/office/powerpoint/2010/main" val="3941549741"/>
+        <p14:creationId xmlns:p14="http://schemas.microsoft.com/office/powerpoint/2010/main" val="41952554"/>
       </p:ext>
     </p:extLst>
   </p:cSld>
@@ -3318,18 +3435,6 @@
               <a:rPr lang="nb-NO" dirty="0" err="1" smtClean="0"/>
               <a:t>OpenCV</a:t>
             </a:r>
-            <a:r>
-              <a:rPr lang="nb-NO" dirty="0" smtClean="0"/>
-              <a:t> + </a:t>
-            </a:r>
-            <a:r>
-              <a:rPr lang="nb-NO" dirty="0" err="1" smtClean="0"/>
-              <a:t>Qt</a:t>
-            </a:r>
-            <a:r>
-              <a:rPr lang="nb-NO" dirty="0" smtClean="0"/>
-              <a:t>. Utstyrsliste</a:t>
-            </a:r>
             <a:endParaRPr lang="nb-NO" dirty="0"/>
           </a:p>
         </p:txBody>
@@ -3349,18 +3454,14 @@
           <a:bodyPr/>
           <a:lstStyle/>
           <a:p>
-            <a:r>
-              <a:rPr lang="nb-NO" dirty="0" smtClean="0"/>
-              <a:t>Utstyrsliste</a:t>
-            </a:r>
-            <a:endParaRPr lang="nb-NO" dirty="0"/>
+            <a:endParaRPr lang="nb-NO"/>
           </a:p>
         </p:txBody>
       </p:sp>
     </p:spTree>
     <p:extLst>
       <p:ext uri="{BB962C8B-B14F-4D97-AF65-F5344CB8AC3E}">
-        <p14:creationId xmlns:p14="http://schemas.microsoft.com/office/powerpoint/2010/main" val="2918596042"/>
+        <p14:creationId xmlns:p14="http://schemas.microsoft.com/office/powerpoint/2010/main" val="3941549741"/>
       </p:ext>
     </p:extLst>
   </p:cSld>
@@ -3414,6 +3515,10 @@
               <a:rPr lang="nb-NO" dirty="0" err="1" smtClean="0"/>
               <a:t>Qt</a:t>
             </a:r>
+            <a:r>
+              <a:rPr lang="nb-NO" dirty="0" smtClean="0"/>
+              <a:t>. Utstyrsliste</a:t>
+            </a:r>
             <a:endParaRPr lang="nb-NO" dirty="0"/>
           </a:p>
         </p:txBody>
@@ -3435,25 +3540,7 @@
           <a:p>
             <a:r>
               <a:rPr lang="nb-NO" dirty="0" smtClean="0"/>
-              <a:t>CMAKE</a:t>
-            </a:r>
-          </a:p>
-          <a:p>
-            <a:r>
-              <a:rPr lang="nb-NO" dirty="0" smtClean="0"/>
-              <a:t>Bygging</a:t>
-            </a:r>
-          </a:p>
-          <a:p>
-            <a:r>
-              <a:rPr lang="nb-NO" dirty="0" smtClean="0"/>
-              <a:t>Kompilator</a:t>
-            </a:r>
-          </a:p>
-          <a:p>
-            <a:r>
-              <a:rPr lang="nb-NO" dirty="0" smtClean="0"/>
-              <a:t>Klargjør for Utvikling</a:t>
+              <a:t>Utstyrsliste</a:t>
             </a:r>
             <a:endParaRPr lang="nb-NO" dirty="0"/>
           </a:p>
@@ -3462,7 +3549,7 @@
     </p:spTree>
     <p:extLst>
       <p:ext uri="{BB962C8B-B14F-4D97-AF65-F5344CB8AC3E}">
-        <p14:creationId xmlns:p14="http://schemas.microsoft.com/office/powerpoint/2010/main" val="3491932799"/>
+        <p14:creationId xmlns:p14="http://schemas.microsoft.com/office/powerpoint/2010/main" val="2918596042"/>
       </p:ext>
     </p:extLst>
   </p:cSld>
@@ -3505,6 +3592,108 @@
           <a:lstStyle/>
           <a:p>
             <a:r>
+              <a:rPr lang="nb-NO" dirty="0" err="1" smtClean="0"/>
+              <a:t>OpenCV</a:t>
+            </a:r>
+            <a:r>
+              <a:rPr lang="nb-NO" dirty="0" smtClean="0"/>
+              <a:t> + </a:t>
+            </a:r>
+            <a:r>
+              <a:rPr lang="nb-NO" dirty="0" err="1" smtClean="0"/>
+              <a:t>Qt</a:t>
+            </a:r>
+            <a:endParaRPr lang="nb-NO" dirty="0"/>
+          </a:p>
+        </p:txBody>
+      </p:sp>
+      <p:sp>
+        <p:nvSpPr>
+          <p:cNvPr id="3" name="Plassholder for innhold 2"/>
+          <p:cNvSpPr>
+            <a:spLocks noGrp="1"/>
+          </p:cNvSpPr>
+          <p:nvPr>
+            <p:ph idx="1"/>
+          </p:nvPr>
+        </p:nvSpPr>
+        <p:spPr/>
+        <p:txBody>
+          <a:bodyPr/>
+          <a:lstStyle/>
+          <a:p>
+            <a:r>
+              <a:rPr lang="nb-NO" dirty="0" smtClean="0"/>
+              <a:t>CMAKE</a:t>
+            </a:r>
+          </a:p>
+          <a:p>
+            <a:r>
+              <a:rPr lang="nb-NO" dirty="0" smtClean="0"/>
+              <a:t>Bygging</a:t>
+            </a:r>
+          </a:p>
+          <a:p>
+            <a:r>
+              <a:rPr lang="nb-NO" dirty="0" smtClean="0"/>
+              <a:t>Kompilator</a:t>
+            </a:r>
+          </a:p>
+          <a:p>
+            <a:r>
+              <a:rPr lang="nb-NO" dirty="0" smtClean="0"/>
+              <a:t>Klargjør for Utvikling</a:t>
+            </a:r>
+            <a:endParaRPr lang="nb-NO" dirty="0"/>
+          </a:p>
+        </p:txBody>
+      </p:sp>
+    </p:spTree>
+    <p:extLst>
+      <p:ext uri="{BB962C8B-B14F-4D97-AF65-F5344CB8AC3E}">
+        <p14:creationId xmlns:p14="http://schemas.microsoft.com/office/powerpoint/2010/main" val="3491932799"/>
+      </p:ext>
+    </p:extLst>
+  </p:cSld>
+  <p:clrMapOvr>
+    <a:masterClrMapping/>
+  </p:clrMapOvr>
+</p:sld>
+</file>
+
+<file path=ppt/slides/slide8.xml><?xml version="1.0" encoding="utf-8"?>
+<p:sld xmlns:a="http://schemas.openxmlformats.org/drawingml/2006/main" xmlns:r="http://schemas.openxmlformats.org/officeDocument/2006/relationships" xmlns:p="http://schemas.openxmlformats.org/presentationml/2006/main">
+  <p:cSld>
+    <p:spTree>
+      <p:nvGrpSpPr>
+        <p:cNvPr id="1" name=""/>
+        <p:cNvGrpSpPr/>
+        <p:nvPr/>
+      </p:nvGrpSpPr>
+      <p:grpSpPr>
+        <a:xfrm>
+          <a:off x="0" y="0"/>
+          <a:ext cx="0" cy="0"/>
+          <a:chOff x="0" y="0"/>
+          <a:chExt cx="0" cy="0"/>
+        </a:xfrm>
+      </p:grpSpPr>
+      <p:sp>
+        <p:nvSpPr>
+          <p:cNvPr id="2" name="Tittel 1"/>
+          <p:cNvSpPr>
+            <a:spLocks noGrp="1"/>
+          </p:cNvSpPr>
+          <p:nvPr>
+            <p:ph type="title"/>
+          </p:nvPr>
+        </p:nvSpPr>
+        <p:spPr/>
+        <p:txBody>
+          <a:bodyPr/>
+          <a:lstStyle/>
+          <a:p>
+            <a:r>
               <a:rPr lang="nb-NO" dirty="0" smtClean="0"/>
               <a:t>Debugging</a:t>
             </a:r>
@@ -3544,7 +3733,7 @@
 </p:sld>
 </file>
 
-<file path=ppt/slides/slide8.xml><?xml version="1.0" encoding="utf-8"?>
+<file path=ppt/slides/slide9.xml><?xml version="1.0" encoding="utf-8"?>
 <p:sld xmlns:a="http://schemas.openxmlformats.org/drawingml/2006/main" xmlns:r="http://schemas.openxmlformats.org/officeDocument/2006/relationships" xmlns:p="http://schemas.openxmlformats.org/presentationml/2006/main">
   <p:cSld>
     <p:spTree>

</xml_diff>